<commit_message>
Day 14 Content updated
</commit_message>
<xml_diff>
--- a/Day14/DockerAndKubernetes_Training-Day14.pptx
+++ b/Day14/DockerAndKubernetes_Training-Day14.pptx
@@ -200,7 +200,7 @@
           <a:p>
             <a:fld id="{B09F413D-6E72-4B8A-80ED-A580F7C91B71}" type="datetimeFigureOut">
               <a:rPr lang="en-IN" smtClean="0"/>
-              <a:t>17-04-2023</a:t>
+              <a:t>24-04-2023</a:t>
             </a:fld>
             <a:endParaRPr lang="en-IN"/>
           </a:p>
@@ -803,7 +803,7 @@
           <a:p>
             <a:fld id="{12E8600E-B0EE-4521-BF40-4B72FBA06775}" type="datetimeFigureOut">
               <a:rPr lang="en-IN" smtClean="0"/>
-              <a:t>17-04-2023</a:t>
+              <a:t>24-04-2023</a:t>
             </a:fld>
             <a:endParaRPr lang="en-IN"/>
           </a:p>
@@ -1892,7 +1892,7 @@
             <a:fld id="{49F3E739-D457-46E5-B626-C9B182A007EE}" type="datetimeFigureOut">
               <a:rPr lang="en-US" smtClean="0"/>
               <a:pPr/>
-              <a:t>4/17/2023</a:t>
+              <a:t>4/24/2023</a:t>
             </a:fld>
             <a:endParaRPr lang="en-US"/>
           </a:p>
@@ -2874,7 +2874,7 @@
             <a:fld id="{49F3E739-D457-46E5-B626-C9B182A007EE}" type="datetimeFigureOut">
               <a:rPr lang="en-US" smtClean="0"/>
               <a:pPr/>
-              <a:t>4/17/2023</a:t>
+              <a:t>4/24/2023</a:t>
             </a:fld>
             <a:endParaRPr lang="en-US"/>
           </a:p>
@@ -4010,7 +4010,7 @@
             <a:fld id="{49F3E739-D457-46E5-B626-C9B182A007EE}" type="datetimeFigureOut">
               <a:rPr lang="en-US" smtClean="0"/>
               <a:pPr/>
-              <a:t>4/17/2023</a:t>
+              <a:t>4/24/2023</a:t>
             </a:fld>
             <a:endParaRPr lang="en-US"/>
           </a:p>
@@ -5045,7 +5045,7 @@
             <a:fld id="{49F3E739-D457-46E5-B626-C9B182A007EE}" type="datetimeFigureOut">
               <a:rPr lang="en-US" smtClean="0"/>
               <a:pPr/>
-              <a:t>4/17/2023</a:t>
+              <a:t>4/24/2023</a:t>
             </a:fld>
             <a:endParaRPr lang="en-US"/>
           </a:p>
@@ -5707,7 +5707,7 @@
             <a:fld id="{49F3E739-D457-46E5-B626-C9B182A007EE}" type="datetimeFigureOut">
               <a:rPr lang="en-US" smtClean="0"/>
               <a:pPr/>
-              <a:t>4/17/2023</a:t>
+              <a:t>4/24/2023</a:t>
             </a:fld>
             <a:endParaRPr lang="en-US"/>
           </a:p>
@@ -6570,7 +6570,7 @@
             <a:fld id="{49F3E739-D457-46E5-B626-C9B182A007EE}" type="datetimeFigureOut">
               <a:rPr lang="en-US" smtClean="0"/>
               <a:pPr/>
-              <a:t>4/17/2023</a:t>
+              <a:t>4/24/2023</a:t>
             </a:fld>
             <a:endParaRPr lang="en-US"/>
           </a:p>
@@ -6761,7 +6761,7 @@
           <a:p>
             <a:fld id="{12E8600E-B0EE-4521-BF40-4B72FBA06775}" type="datetimeFigureOut">
               <a:rPr lang="en-IN" smtClean="0"/>
-              <a:t>17-04-2023</a:t>
+              <a:t>24-04-2023</a:t>
             </a:fld>
             <a:endParaRPr lang="en-IN"/>
           </a:p>
@@ -7733,7 +7733,7 @@
           <a:p>
             <a:fld id="{12E8600E-B0EE-4521-BF40-4B72FBA06775}" type="datetimeFigureOut">
               <a:rPr lang="en-IN" smtClean="0"/>
-              <a:t>17-04-2023</a:t>
+              <a:t>24-04-2023</a:t>
             </a:fld>
             <a:endParaRPr lang="en-IN"/>
           </a:p>
@@ -7944,7 +7944,7 @@
           <a:p>
             <a:fld id="{12E8600E-B0EE-4521-BF40-4B72FBA06775}" type="datetimeFigureOut">
               <a:rPr lang="en-IN" smtClean="0"/>
-              <a:t>17-04-2023</a:t>
+              <a:t>24-04-2023</a:t>
             </a:fld>
             <a:endParaRPr lang="en-IN"/>
           </a:p>
@@ -8978,7 +8978,7 @@
           <a:p>
             <a:fld id="{12E8600E-B0EE-4521-BF40-4B72FBA06775}" type="datetimeFigureOut">
               <a:rPr lang="en-IN" smtClean="0"/>
-              <a:t>17-04-2023</a:t>
+              <a:t>24-04-2023</a:t>
             </a:fld>
             <a:endParaRPr lang="en-IN"/>
           </a:p>
@@ -9250,7 +9250,7 @@
           <a:p>
             <a:fld id="{12E8600E-B0EE-4521-BF40-4B72FBA06775}" type="datetimeFigureOut">
               <a:rPr lang="en-IN" smtClean="0"/>
-              <a:t>17-04-2023</a:t>
+              <a:t>24-04-2023</a:t>
             </a:fld>
             <a:endParaRPr lang="en-IN"/>
           </a:p>
@@ -9661,7 +9661,7 @@
             <a:fld id="{49F3E739-D457-46E5-B626-C9B182A007EE}" type="datetimeFigureOut">
               <a:rPr lang="en-US" smtClean="0"/>
               <a:pPr/>
-              <a:t>4/17/2023</a:t>
+              <a:t>4/24/2023</a:t>
             </a:fld>
             <a:endParaRPr lang="en-US"/>
           </a:p>
@@ -9789,7 +9789,7 @@
           <a:p>
             <a:fld id="{12E8600E-B0EE-4521-BF40-4B72FBA06775}" type="datetimeFigureOut">
               <a:rPr lang="en-IN" smtClean="0"/>
-              <a:t>17-04-2023</a:t>
+              <a:t>24-04-2023</a:t>
             </a:fld>
             <a:endParaRPr lang="en-IN"/>
           </a:p>
@@ -9884,7 +9884,7 @@
           <a:p>
             <a:fld id="{12E8600E-B0EE-4521-BF40-4B72FBA06775}" type="datetimeFigureOut">
               <a:rPr lang="en-IN" smtClean="0"/>
-              <a:t>17-04-2023</a:t>
+              <a:t>24-04-2023</a:t>
             </a:fld>
             <a:endParaRPr lang="en-IN"/>
           </a:p>
@@ -10965,7 +10965,7 @@
           <a:p>
             <a:fld id="{12E8600E-B0EE-4521-BF40-4B72FBA06775}" type="datetimeFigureOut">
               <a:rPr lang="en-IN" smtClean="0"/>
-              <a:t>17-04-2023</a:t>
+              <a:t>24-04-2023</a:t>
             </a:fld>
             <a:endParaRPr lang="en-IN"/>
           </a:p>
@@ -12074,7 +12074,7 @@
             <a:fld id="{49F3E739-D457-46E5-B626-C9B182A007EE}" type="datetimeFigureOut">
               <a:rPr lang="en-US" smtClean="0"/>
               <a:pPr/>
-              <a:t>4/17/2023</a:t>
+              <a:t>4/24/2023</a:t>
             </a:fld>
             <a:endParaRPr lang="en-US"/>
           </a:p>
@@ -13073,7 +13073,7 @@
             <a:fld id="{49F3E739-D457-46E5-B626-C9B182A007EE}" type="datetimeFigureOut">
               <a:rPr lang="en-US" smtClean="0"/>
               <a:pPr/>
-              <a:t>4/17/2023</a:t>
+              <a:t>4/24/2023</a:t>
             </a:fld>
             <a:endParaRPr lang="en-US"/>
           </a:p>
@@ -13661,7 +13661,7 @@
           <a:p>
             <a:r>
               <a:rPr lang="en-US" sz="4800" b="1" i="1" dirty="0"/>
-              <a:t>DAY 10</a:t>
+              <a:t>DAY 14</a:t>
             </a:r>
             <a:endParaRPr lang="en-IN" sz="4800" b="1" i="1" dirty="0"/>
           </a:p>
@@ -13791,7 +13791,7 @@
         </p:nvSpPr>
         <p:spPr>
           <a:xfrm>
-            <a:off x="717453" y="2475914"/>
+            <a:off x="717453" y="2445934"/>
             <a:ext cx="4963819" cy="3727937"/>
           </a:xfrm>
           <a:prstGeom prst="rect">
@@ -14038,32 +14038,78 @@
           <a:p>
             <a:r>
               <a:rPr lang="en-US" dirty="0"/>
-              <a:t>Docker Compose - Demo</a:t>
+              <a:t>Docker Compose – Demo</a:t>
             </a:r>
           </a:p>
           <a:p>
+            <a:pPr lvl="1"/>
             <a:r>
               <a:rPr lang="en-US" dirty="0"/>
-              <a:t>Container Orchestration</a:t>
+              <a:t>Example voting app</a:t>
             </a:r>
           </a:p>
           <a:p>
+            <a:pPr lvl="1"/>
             <a:r>
               <a:rPr lang="en-US" dirty="0"/>
-              <a:t>Docker Networking</a:t>
+              <a:t>Docker compose helpful commands</a:t>
             </a:r>
           </a:p>
           <a:p>
+            <a:pPr lvl="1"/>
             <a:r>
               <a:rPr lang="en-US" dirty="0"/>
-              <a:t>Docker Swarm Architecture</a:t>
+              <a:t>Docker-compose second level – v2/v3</a:t>
             </a:r>
           </a:p>
           <a:p>
+            <a:pPr lvl="2"/>
             <a:r>
               <a:rPr lang="en-US" dirty="0"/>
-              <a:t>Docker Swarm Demo</a:t>
+              <a:t>Docker compose file – brief</a:t>
             </a:r>
+          </a:p>
+          <a:p>
+            <a:pPr lvl="2"/>
+            <a:r>
+              <a:rPr lang="en-US" dirty="0"/>
+              <a:t>Individual components</a:t>
+            </a:r>
+          </a:p>
+          <a:p>
+            <a:pPr lvl="2"/>
+            <a:r>
+              <a:rPr lang="en-US" dirty="0"/>
+              <a:t>Application deployment</a:t>
+            </a:r>
+          </a:p>
+          <a:p>
+            <a:pPr lvl="2"/>
+            <a:r>
+              <a:rPr lang="en-US" dirty="0"/>
+              <a:t>Build process</a:t>
+            </a:r>
+          </a:p>
+          <a:p>
+            <a:pPr lvl="1"/>
+            <a:r>
+              <a:rPr lang="en-US" dirty="0"/>
+              <a:t>Container Orchestration Need</a:t>
+            </a:r>
+          </a:p>
+          <a:p>
+            <a:pPr lvl="2"/>
+            <a:endParaRPr lang="en-US" dirty="0"/>
+          </a:p>
+          <a:p>
+            <a:pPr marL="914400" lvl="2" indent="0">
+              <a:buNone/>
+            </a:pPr>
+            <a:endParaRPr lang="en-US" dirty="0"/>
+          </a:p>
+          <a:p>
+            <a:pPr lvl="1"/>
+            <a:endParaRPr lang="en-US" dirty="0"/>
           </a:p>
           <a:p>
             <a:pPr marL="1371600" lvl="3" indent="0">
@@ -15028,20 +15074,57 @@
           <a:p>
             <a:r>
               <a:rPr lang="en-IN" dirty="0"/>
-              <a:t>Docker command Executed reference guide</a:t>
+              <a:t>Docker compose command Executed reference guide</a:t>
             </a:r>
           </a:p>
           <a:p>
             <a:r>
               <a:rPr lang="en-IN" dirty="0"/>
-              <a:t>Docker Swarm Referenced Architecture</a:t>
+              <a:t>Docker Compose Small App</a:t>
             </a:r>
           </a:p>
           <a:p>
+            <a:pPr lvl="1"/>
             <a:r>
               <a:rPr lang="en-IN" dirty="0"/>
-              <a:t>Other references</a:t>
+              <a:t>Official Docker</a:t>
             </a:r>
+          </a:p>
+          <a:p>
+            <a:r>
+              <a:rPr lang="en-IN" dirty="0"/>
+              <a:t>Docker Compose Awesome Examples</a:t>
+            </a:r>
+          </a:p>
+          <a:p>
+            <a:pPr lvl="1"/>
+            <a:r>
+              <a:rPr lang="en-IN" dirty="0">
+                <a:hlinkClick r:id="rId2"/>
+              </a:rPr>
+              <a:t>https://github.com/docker/awesome-compose</a:t>
+            </a:r>
+            <a:endParaRPr lang="en-IN" dirty="0"/>
+          </a:p>
+          <a:p>
+            <a:r>
+              <a:rPr lang="en-IN" dirty="0"/>
+              <a:t>Docker Compose Demo in details</a:t>
+            </a:r>
+          </a:p>
+          <a:p>
+            <a:pPr lvl="1"/>
+            <a:r>
+              <a:rPr lang="en-IN" dirty="0"/>
+              <a:t>Voting App Example - </a:t>
+            </a:r>
+            <a:r>
+              <a:rPr lang="en-IN" dirty="0">
+                <a:hlinkClick r:id="rId3"/>
+              </a:rPr>
+              <a:t>https://github.com/dockersamples/example-voting-app</a:t>
+            </a:r>
+            <a:endParaRPr lang="en-IN" dirty="0"/>
           </a:p>
           <a:p>
             <a:endParaRPr lang="en-IN" dirty="0"/>

</xml_diff>

<commit_message>
day 14 agenda updated
</commit_message>
<xml_diff>
--- a/Day14/DockerAndKubernetes_Training-Day14.pptx
+++ b/Day14/DockerAndKubernetes_Training-Day14.pptx
@@ -5,13 +5,12 @@
     <p:sldMasterId id="2147483880" r:id="rId1"/>
   </p:sldMasterIdLst>
   <p:notesMasterIdLst>
-    <p:notesMasterId r:id="rId6"/>
+    <p:notesMasterId r:id="rId5"/>
   </p:notesMasterIdLst>
   <p:sldIdLst>
     <p:sldId id="439" r:id="rId2"/>
     <p:sldId id="442" r:id="rId3"/>
-    <p:sldId id="267" r:id="rId4"/>
-    <p:sldId id="438" r:id="rId5"/>
+    <p:sldId id="438" r:id="rId4"/>
   </p:sldIdLst>
   <p:sldSz cx="12192000" cy="6858000"/>
   <p:notesSz cx="6858000" cy="9144000"/>
@@ -200,7 +199,7 @@
           <a:p>
             <a:fld id="{B09F413D-6E72-4B8A-80ED-A580F7C91B71}" type="datetimeFigureOut">
               <a:rPr lang="en-IN" smtClean="0"/>
-              <a:t>24-04-2023</a:t>
+              <a:t>25-04-2023</a:t>
             </a:fld>
             <a:endParaRPr lang="en-IN"/>
           </a:p>
@@ -803,7 +802,7 @@
           <a:p>
             <a:fld id="{12E8600E-B0EE-4521-BF40-4B72FBA06775}" type="datetimeFigureOut">
               <a:rPr lang="en-IN" smtClean="0"/>
-              <a:t>24-04-2023</a:t>
+              <a:t>25-04-2023</a:t>
             </a:fld>
             <a:endParaRPr lang="en-IN"/>
           </a:p>
@@ -1892,7 +1891,7 @@
             <a:fld id="{49F3E739-D457-46E5-B626-C9B182A007EE}" type="datetimeFigureOut">
               <a:rPr lang="en-US" smtClean="0"/>
               <a:pPr/>
-              <a:t>4/24/2023</a:t>
+              <a:t>4/25/2023</a:t>
             </a:fld>
             <a:endParaRPr lang="en-US"/>
           </a:p>
@@ -2874,7 +2873,7 @@
             <a:fld id="{49F3E739-D457-46E5-B626-C9B182A007EE}" type="datetimeFigureOut">
               <a:rPr lang="en-US" smtClean="0"/>
               <a:pPr/>
-              <a:t>4/24/2023</a:t>
+              <a:t>4/25/2023</a:t>
             </a:fld>
             <a:endParaRPr lang="en-US"/>
           </a:p>
@@ -4010,7 +4009,7 @@
             <a:fld id="{49F3E739-D457-46E5-B626-C9B182A007EE}" type="datetimeFigureOut">
               <a:rPr lang="en-US" smtClean="0"/>
               <a:pPr/>
-              <a:t>4/24/2023</a:t>
+              <a:t>4/25/2023</a:t>
             </a:fld>
             <a:endParaRPr lang="en-US"/>
           </a:p>
@@ -5045,7 +5044,7 @@
             <a:fld id="{49F3E739-D457-46E5-B626-C9B182A007EE}" type="datetimeFigureOut">
               <a:rPr lang="en-US" smtClean="0"/>
               <a:pPr/>
-              <a:t>4/24/2023</a:t>
+              <a:t>4/25/2023</a:t>
             </a:fld>
             <a:endParaRPr lang="en-US"/>
           </a:p>
@@ -5707,7 +5706,7 @@
             <a:fld id="{49F3E739-D457-46E5-B626-C9B182A007EE}" type="datetimeFigureOut">
               <a:rPr lang="en-US" smtClean="0"/>
               <a:pPr/>
-              <a:t>4/24/2023</a:t>
+              <a:t>4/25/2023</a:t>
             </a:fld>
             <a:endParaRPr lang="en-US"/>
           </a:p>
@@ -6570,7 +6569,7 @@
             <a:fld id="{49F3E739-D457-46E5-B626-C9B182A007EE}" type="datetimeFigureOut">
               <a:rPr lang="en-US" smtClean="0"/>
               <a:pPr/>
-              <a:t>4/24/2023</a:t>
+              <a:t>4/25/2023</a:t>
             </a:fld>
             <a:endParaRPr lang="en-US"/>
           </a:p>
@@ -6761,7 +6760,7 @@
           <a:p>
             <a:fld id="{12E8600E-B0EE-4521-BF40-4B72FBA06775}" type="datetimeFigureOut">
               <a:rPr lang="en-IN" smtClean="0"/>
-              <a:t>24-04-2023</a:t>
+              <a:t>25-04-2023</a:t>
             </a:fld>
             <a:endParaRPr lang="en-IN"/>
           </a:p>
@@ -7733,7 +7732,7 @@
           <a:p>
             <a:fld id="{12E8600E-B0EE-4521-BF40-4B72FBA06775}" type="datetimeFigureOut">
               <a:rPr lang="en-IN" smtClean="0"/>
-              <a:t>24-04-2023</a:t>
+              <a:t>25-04-2023</a:t>
             </a:fld>
             <a:endParaRPr lang="en-IN"/>
           </a:p>
@@ -7944,7 +7943,7 @@
           <a:p>
             <a:fld id="{12E8600E-B0EE-4521-BF40-4B72FBA06775}" type="datetimeFigureOut">
               <a:rPr lang="en-IN" smtClean="0"/>
-              <a:t>24-04-2023</a:t>
+              <a:t>25-04-2023</a:t>
             </a:fld>
             <a:endParaRPr lang="en-IN"/>
           </a:p>
@@ -8978,7 +8977,7 @@
           <a:p>
             <a:fld id="{12E8600E-B0EE-4521-BF40-4B72FBA06775}" type="datetimeFigureOut">
               <a:rPr lang="en-IN" smtClean="0"/>
-              <a:t>24-04-2023</a:t>
+              <a:t>25-04-2023</a:t>
             </a:fld>
             <a:endParaRPr lang="en-IN"/>
           </a:p>
@@ -9250,7 +9249,7 @@
           <a:p>
             <a:fld id="{12E8600E-B0EE-4521-BF40-4B72FBA06775}" type="datetimeFigureOut">
               <a:rPr lang="en-IN" smtClean="0"/>
-              <a:t>24-04-2023</a:t>
+              <a:t>25-04-2023</a:t>
             </a:fld>
             <a:endParaRPr lang="en-IN"/>
           </a:p>
@@ -9661,7 +9660,7 @@
             <a:fld id="{49F3E739-D457-46E5-B626-C9B182A007EE}" type="datetimeFigureOut">
               <a:rPr lang="en-US" smtClean="0"/>
               <a:pPr/>
-              <a:t>4/24/2023</a:t>
+              <a:t>4/25/2023</a:t>
             </a:fld>
             <a:endParaRPr lang="en-US"/>
           </a:p>
@@ -9789,7 +9788,7 @@
           <a:p>
             <a:fld id="{12E8600E-B0EE-4521-BF40-4B72FBA06775}" type="datetimeFigureOut">
               <a:rPr lang="en-IN" smtClean="0"/>
-              <a:t>24-04-2023</a:t>
+              <a:t>25-04-2023</a:t>
             </a:fld>
             <a:endParaRPr lang="en-IN"/>
           </a:p>
@@ -9884,7 +9883,7 @@
           <a:p>
             <a:fld id="{12E8600E-B0EE-4521-BF40-4B72FBA06775}" type="datetimeFigureOut">
               <a:rPr lang="en-IN" smtClean="0"/>
-              <a:t>24-04-2023</a:t>
+              <a:t>25-04-2023</a:t>
             </a:fld>
             <a:endParaRPr lang="en-IN"/>
           </a:p>
@@ -10965,7 +10964,7 @@
           <a:p>
             <a:fld id="{12E8600E-B0EE-4521-BF40-4B72FBA06775}" type="datetimeFigureOut">
               <a:rPr lang="en-IN" smtClean="0"/>
-              <a:t>24-04-2023</a:t>
+              <a:t>25-04-2023</a:t>
             </a:fld>
             <a:endParaRPr lang="en-IN"/>
           </a:p>
@@ -12074,7 +12073,7 @@
             <a:fld id="{49F3E739-D457-46E5-B626-C9B182A007EE}" type="datetimeFigureOut">
               <a:rPr lang="en-US" smtClean="0"/>
               <a:pPr/>
-              <a:t>4/24/2023</a:t>
+              <a:t>4/25/2023</a:t>
             </a:fld>
             <a:endParaRPr lang="en-US"/>
           </a:p>
@@ -13073,7 +13072,7 @@
             <a:fld id="{49F3E739-D457-46E5-B626-C9B182A007EE}" type="datetimeFigureOut">
               <a:rPr lang="en-US" smtClean="0"/>
               <a:pPr/>
-              <a:t>4/24/2023</a:t>
+              <a:t>4/25/2023</a:t>
             </a:fld>
             <a:endParaRPr lang="en-US"/>
           </a:p>
@@ -13800,7 +13799,7 @@
         </p:spPr>
         <p:txBody>
           <a:bodyPr vert="horz" lIns="91440" tIns="45720" rIns="91440" bIns="45720" rtlCol="0">
-            <a:normAutofit/>
+            <a:normAutofit fontScale="85000" lnSpcReduction="20000"/>
           </a:bodyPr>
           <a:lstStyle>
             <a:lvl1pPr marL="342900" indent="-342900" algn="l" defTabSz="457200" rtl="0" eaLnBrk="1" latinLnBrk="0" hangingPunct="1">
@@ -14038,7 +14037,7 @@
           <a:p>
             <a:r>
               <a:rPr lang="en-US" dirty="0"/>
-              <a:t>Docker Compose – Demo</a:t>
+              <a:t>Docker Compose v3.0 – Demo</a:t>
             </a:r>
           </a:p>
           <a:p>
@@ -14091,11 +14090,36 @@
             </a:r>
           </a:p>
           <a:p>
-            <a:pPr lvl="1"/>
+            <a:pPr lvl="2"/>
             <a:r>
               <a:rPr lang="en-US" dirty="0"/>
-              <a:t>Container Orchestration Need</a:t>
+              <a:t>Docker compose rebuild</a:t>
             </a:r>
+          </a:p>
+          <a:p>
+            <a:pPr lvl="2"/>
+            <a:r>
+              <a:rPr lang="en-US" dirty="0"/>
+              <a:t>Docker compose one off commands</a:t>
+            </a:r>
+          </a:p>
+          <a:p>
+            <a:pPr lvl="2"/>
+            <a:r>
+              <a:rPr lang="en-US" dirty="0"/>
+              <a:t>Docker compose Environment variables</a:t>
+            </a:r>
+          </a:p>
+          <a:p>
+            <a:pPr lvl="2"/>
+            <a:r>
+              <a:rPr lang="en-US" dirty="0"/>
+              <a:t>Nodejs example for demo</a:t>
+            </a:r>
+          </a:p>
+          <a:p>
+            <a:pPr lvl="1"/>
+            <a:endParaRPr lang="en-US" dirty="0"/>
           </a:p>
           <a:p>
             <a:pPr lvl="2"/>
@@ -14180,846 +14204,6 @@
           <p:cNvPr id="2" name="Title 1">
             <a:extLst>
               <a:ext uri="{FF2B5EF4-FFF2-40B4-BE49-F238E27FC236}">
-                <a16:creationId xmlns:a16="http://schemas.microsoft.com/office/drawing/2014/main" id="{97BC34CC-2191-086A-75CD-07624340C7B3}"/>
-              </a:ext>
-            </a:extLst>
-          </p:cNvPr>
-          <p:cNvSpPr>
-            <a:spLocks noGrp="1"/>
-          </p:cNvSpPr>
-          <p:nvPr>
-            <p:ph type="title"/>
-          </p:nvPr>
-        </p:nvSpPr>
-        <p:spPr>
-          <a:xfrm>
-            <a:off x="1154953" y="973668"/>
-            <a:ext cx="9128734" cy="706964"/>
-          </a:xfrm>
-        </p:spPr>
-        <p:txBody>
-          <a:bodyPr>
-            <a:normAutofit/>
-          </a:bodyPr>
-          <a:lstStyle/>
-          <a:p>
-            <a:r>
-              <a:rPr lang="en-US" sz="2800" dirty="0"/>
-              <a:t>CONTAINER ORCHESTRATION – DOCKER SWARM</a:t>
-            </a:r>
-            <a:endParaRPr lang="en-IN" sz="2800" dirty="0"/>
-          </a:p>
-        </p:txBody>
-      </p:sp>
-      <p:sp>
-        <p:nvSpPr>
-          <p:cNvPr id="3" name="Content Placeholder 2">
-            <a:extLst>
-              <a:ext uri="{FF2B5EF4-FFF2-40B4-BE49-F238E27FC236}">
-                <a16:creationId xmlns:a16="http://schemas.microsoft.com/office/drawing/2014/main" id="{5188517A-DD37-A765-9F25-8A87477F3848}"/>
-              </a:ext>
-            </a:extLst>
-          </p:cNvPr>
-          <p:cNvSpPr>
-            <a:spLocks noGrp="1"/>
-          </p:cNvSpPr>
-          <p:nvPr>
-            <p:ph idx="1"/>
-          </p:nvPr>
-        </p:nvSpPr>
-        <p:spPr>
-          <a:xfrm>
-            <a:off x="1154955" y="2603500"/>
-            <a:ext cx="4795271" cy="3416300"/>
-          </a:xfrm>
-        </p:spPr>
-        <p:txBody>
-          <a:bodyPr>
-            <a:normAutofit/>
-          </a:bodyPr>
-          <a:lstStyle/>
-          <a:p>
-            <a:r>
-              <a:rPr lang="en-US" sz="2400" dirty="0"/>
-              <a:t>Native Clustering System</a:t>
-            </a:r>
-          </a:p>
-          <a:p>
-            <a:r>
-              <a:rPr lang="en-US" sz="2400" dirty="0"/>
-              <a:t>Clustering (management) for Docker</a:t>
-            </a:r>
-          </a:p>
-          <a:p>
-            <a:r>
-              <a:rPr lang="en-US" sz="2400" dirty="0"/>
-              <a:t>Manage multiple Docker daemons</a:t>
-            </a:r>
-          </a:p>
-          <a:p>
-            <a:r>
-              <a:rPr lang="en-US" sz="2400" dirty="0"/>
-              <a:t>Distribute workloads</a:t>
-            </a:r>
-            <a:endParaRPr lang="en-IN" sz="2400" dirty="0"/>
-          </a:p>
-        </p:txBody>
-      </p:sp>
-      <p:pic>
-        <p:nvPicPr>
-          <p:cNvPr id="4" name="Picture 3">
-            <a:extLst>
-              <a:ext uri="{FF2B5EF4-FFF2-40B4-BE49-F238E27FC236}">
-                <a16:creationId xmlns:a16="http://schemas.microsoft.com/office/drawing/2014/main" id="{801C5B4C-075E-C636-3249-8D1884ADA1C4}"/>
-              </a:ext>
-            </a:extLst>
-          </p:cNvPr>
-          <p:cNvPicPr>
-            <a:picLocks noChangeAspect="1"/>
-          </p:cNvPicPr>
-          <p:nvPr/>
-        </p:nvPicPr>
-        <p:blipFill>
-          <a:blip r:embed="rId2">
-            <a:extLst>
-              <a:ext uri="{28A0092B-C50C-407E-A947-70E740481C1C}">
-                <a14:useLocalDpi xmlns:a14="http://schemas.microsoft.com/office/drawing/2010/main" val="0"/>
-              </a:ext>
-            </a:extLst>
-          </a:blip>
-          <a:stretch>
-            <a:fillRect/>
-          </a:stretch>
-        </p:blipFill>
-        <p:spPr>
-          <a:xfrm>
-            <a:off x="5719320" y="1950217"/>
-            <a:ext cx="6186912" cy="4722866"/>
-          </a:xfrm>
-          <a:prstGeom prst="rect">
-            <a:avLst/>
-          </a:prstGeom>
-        </p:spPr>
-      </p:pic>
-    </p:spTree>
-    <p:extLst>
-      <p:ext uri="{BB962C8B-B14F-4D97-AF65-F5344CB8AC3E}">
-        <p14:creationId xmlns:p14="http://schemas.microsoft.com/office/powerpoint/2010/main" val="3666468436"/>
-      </p:ext>
-    </p:extLst>
-  </p:cSld>
-  <p:clrMapOvr>
-    <a:masterClrMapping/>
-  </p:clrMapOvr>
-  <p:timing>
-    <p:tnLst>
-      <p:par>
-        <p:cTn id="1" dur="indefinite" restart="never" nodeType="tmRoot">
-          <p:childTnLst>
-            <p:seq concurrent="1" nextAc="seek">
-              <p:cTn id="2" dur="indefinite" nodeType="mainSeq">
-                <p:childTnLst>
-                  <p:par>
-                    <p:cTn id="3" fill="hold">
-                      <p:stCondLst>
-                        <p:cond delay="indefinite"/>
-                      </p:stCondLst>
-                      <p:childTnLst>
-                        <p:par>
-                          <p:cTn id="4" fill="hold">
-                            <p:stCondLst>
-                              <p:cond delay="0"/>
-                            </p:stCondLst>
-                            <p:childTnLst>
-                              <p:par>
-                                <p:cTn id="5" presetID="2" presetClass="entr" presetSubtype="4" fill="hold" grpId="0" nodeType="clickEffect">
-                                  <p:stCondLst>
-                                    <p:cond delay="0"/>
-                                  </p:stCondLst>
-                                  <p:childTnLst>
-                                    <p:set>
-                                      <p:cBhvr>
-                                        <p:cTn id="6" dur="1" fill="hold">
-                                          <p:stCondLst>
-                                            <p:cond delay="0"/>
-                                          </p:stCondLst>
-                                        </p:cTn>
-                                        <p:tgtEl>
-                                          <p:spTgt spid="2"/>
-                                        </p:tgtEl>
-                                        <p:attrNameLst>
-                                          <p:attrName>style.visibility</p:attrName>
-                                        </p:attrNameLst>
-                                      </p:cBhvr>
-                                      <p:to>
-                                        <p:strVal val="visible"/>
-                                      </p:to>
-                                    </p:set>
-                                    <p:anim calcmode="lin" valueType="num">
-                                      <p:cBhvr additive="base">
-                                        <p:cTn id="7" dur="500" fill="hold"/>
-                                        <p:tgtEl>
-                                          <p:spTgt spid="2"/>
-                                        </p:tgtEl>
-                                        <p:attrNameLst>
-                                          <p:attrName>ppt_x</p:attrName>
-                                        </p:attrNameLst>
-                                      </p:cBhvr>
-                                      <p:tavLst>
-                                        <p:tav tm="0">
-                                          <p:val>
-                                            <p:strVal val="#ppt_x"/>
-                                          </p:val>
-                                        </p:tav>
-                                        <p:tav tm="100000">
-                                          <p:val>
-                                            <p:strVal val="#ppt_x"/>
-                                          </p:val>
-                                        </p:tav>
-                                      </p:tavLst>
-                                    </p:anim>
-                                    <p:anim calcmode="lin" valueType="num">
-                                      <p:cBhvr additive="base">
-                                        <p:cTn id="8" dur="500" fill="hold"/>
-                                        <p:tgtEl>
-                                          <p:spTgt spid="2"/>
-                                        </p:tgtEl>
-                                        <p:attrNameLst>
-                                          <p:attrName>ppt_y</p:attrName>
-                                        </p:attrNameLst>
-                                      </p:cBhvr>
-                                      <p:tavLst>
-                                        <p:tav tm="0">
-                                          <p:val>
-                                            <p:strVal val="1+#ppt_h/2"/>
-                                          </p:val>
-                                        </p:tav>
-                                        <p:tav tm="100000">
-                                          <p:val>
-                                            <p:strVal val="#ppt_y"/>
-                                          </p:val>
-                                        </p:tav>
-                                      </p:tavLst>
-                                    </p:anim>
-                                  </p:childTnLst>
-                                </p:cTn>
-                              </p:par>
-                            </p:childTnLst>
-                          </p:cTn>
-                        </p:par>
-                      </p:childTnLst>
-                    </p:cTn>
-                  </p:par>
-                  <p:par>
-                    <p:cTn id="9" fill="hold">
-                      <p:stCondLst>
-                        <p:cond delay="indefinite"/>
-                      </p:stCondLst>
-                      <p:childTnLst>
-                        <p:par>
-                          <p:cTn id="10" fill="hold">
-                            <p:stCondLst>
-                              <p:cond delay="0"/>
-                            </p:stCondLst>
-                            <p:childTnLst>
-                              <p:par>
-                                <p:cTn id="11" presetID="42" presetClass="entr" presetSubtype="0" fill="hold" grpId="0" nodeType="clickEffect">
-                                  <p:stCondLst>
-                                    <p:cond delay="0"/>
-                                  </p:stCondLst>
-                                  <p:childTnLst>
-                                    <p:set>
-                                      <p:cBhvr>
-                                        <p:cTn id="12" dur="1" fill="hold">
-                                          <p:stCondLst>
-                                            <p:cond delay="0"/>
-                                          </p:stCondLst>
-                                        </p:cTn>
-                                        <p:tgtEl>
-                                          <p:spTgt spid="3">
-                                            <p:txEl>
-                                              <p:pRg st="0" end="0"/>
-                                            </p:txEl>
-                                          </p:spTgt>
-                                        </p:tgtEl>
-                                        <p:attrNameLst>
-                                          <p:attrName>style.visibility</p:attrName>
-                                        </p:attrNameLst>
-                                      </p:cBhvr>
-                                      <p:to>
-                                        <p:strVal val="visible"/>
-                                      </p:to>
-                                    </p:set>
-                                    <p:animEffect transition="in" filter="fade">
-                                      <p:cBhvr>
-                                        <p:cTn id="13" dur="1000"/>
-                                        <p:tgtEl>
-                                          <p:spTgt spid="3">
-                                            <p:txEl>
-                                              <p:pRg st="0" end="0"/>
-                                            </p:txEl>
-                                          </p:spTgt>
-                                        </p:tgtEl>
-                                      </p:cBhvr>
-                                    </p:animEffect>
-                                    <p:anim calcmode="lin" valueType="num">
-                                      <p:cBhvr>
-                                        <p:cTn id="14" dur="1000" fill="hold"/>
-                                        <p:tgtEl>
-                                          <p:spTgt spid="3">
-                                            <p:txEl>
-                                              <p:pRg st="0" end="0"/>
-                                            </p:txEl>
-                                          </p:spTgt>
-                                        </p:tgtEl>
-                                        <p:attrNameLst>
-                                          <p:attrName>ppt_x</p:attrName>
-                                        </p:attrNameLst>
-                                      </p:cBhvr>
-                                      <p:tavLst>
-                                        <p:tav tm="0">
-                                          <p:val>
-                                            <p:strVal val="#ppt_x"/>
-                                          </p:val>
-                                        </p:tav>
-                                        <p:tav tm="100000">
-                                          <p:val>
-                                            <p:strVal val="#ppt_x"/>
-                                          </p:val>
-                                        </p:tav>
-                                      </p:tavLst>
-                                    </p:anim>
-                                    <p:anim calcmode="lin" valueType="num">
-                                      <p:cBhvr>
-                                        <p:cTn id="15" dur="1000" fill="hold"/>
-                                        <p:tgtEl>
-                                          <p:spTgt spid="3">
-                                            <p:txEl>
-                                              <p:pRg st="0" end="0"/>
-                                            </p:txEl>
-                                          </p:spTgt>
-                                        </p:tgtEl>
-                                        <p:attrNameLst>
-                                          <p:attrName>ppt_y</p:attrName>
-                                        </p:attrNameLst>
-                                      </p:cBhvr>
-                                      <p:tavLst>
-                                        <p:tav tm="0">
-                                          <p:val>
-                                            <p:strVal val="#ppt_y+.1"/>
-                                          </p:val>
-                                        </p:tav>
-                                        <p:tav tm="100000">
-                                          <p:val>
-                                            <p:strVal val="#ppt_y"/>
-                                          </p:val>
-                                        </p:tav>
-                                      </p:tavLst>
-                                    </p:anim>
-                                  </p:childTnLst>
-                                </p:cTn>
-                              </p:par>
-                            </p:childTnLst>
-                          </p:cTn>
-                        </p:par>
-                      </p:childTnLst>
-                    </p:cTn>
-                  </p:par>
-                  <p:par>
-                    <p:cTn id="16" fill="hold">
-                      <p:stCondLst>
-                        <p:cond delay="indefinite"/>
-                      </p:stCondLst>
-                      <p:childTnLst>
-                        <p:par>
-                          <p:cTn id="17" fill="hold">
-                            <p:stCondLst>
-                              <p:cond delay="0"/>
-                            </p:stCondLst>
-                            <p:childTnLst>
-                              <p:par>
-                                <p:cTn id="18" presetID="42" presetClass="entr" presetSubtype="0" fill="hold" grpId="0" nodeType="clickEffect">
-                                  <p:stCondLst>
-                                    <p:cond delay="0"/>
-                                  </p:stCondLst>
-                                  <p:childTnLst>
-                                    <p:set>
-                                      <p:cBhvr>
-                                        <p:cTn id="19" dur="1" fill="hold">
-                                          <p:stCondLst>
-                                            <p:cond delay="0"/>
-                                          </p:stCondLst>
-                                        </p:cTn>
-                                        <p:tgtEl>
-                                          <p:spTgt spid="3">
-                                            <p:txEl>
-                                              <p:pRg st="1" end="1"/>
-                                            </p:txEl>
-                                          </p:spTgt>
-                                        </p:tgtEl>
-                                        <p:attrNameLst>
-                                          <p:attrName>style.visibility</p:attrName>
-                                        </p:attrNameLst>
-                                      </p:cBhvr>
-                                      <p:to>
-                                        <p:strVal val="visible"/>
-                                      </p:to>
-                                    </p:set>
-                                    <p:animEffect transition="in" filter="fade">
-                                      <p:cBhvr>
-                                        <p:cTn id="20" dur="1000"/>
-                                        <p:tgtEl>
-                                          <p:spTgt spid="3">
-                                            <p:txEl>
-                                              <p:pRg st="1" end="1"/>
-                                            </p:txEl>
-                                          </p:spTgt>
-                                        </p:tgtEl>
-                                      </p:cBhvr>
-                                    </p:animEffect>
-                                    <p:anim calcmode="lin" valueType="num">
-                                      <p:cBhvr>
-                                        <p:cTn id="21" dur="1000" fill="hold"/>
-                                        <p:tgtEl>
-                                          <p:spTgt spid="3">
-                                            <p:txEl>
-                                              <p:pRg st="1" end="1"/>
-                                            </p:txEl>
-                                          </p:spTgt>
-                                        </p:tgtEl>
-                                        <p:attrNameLst>
-                                          <p:attrName>ppt_x</p:attrName>
-                                        </p:attrNameLst>
-                                      </p:cBhvr>
-                                      <p:tavLst>
-                                        <p:tav tm="0">
-                                          <p:val>
-                                            <p:strVal val="#ppt_x"/>
-                                          </p:val>
-                                        </p:tav>
-                                        <p:tav tm="100000">
-                                          <p:val>
-                                            <p:strVal val="#ppt_x"/>
-                                          </p:val>
-                                        </p:tav>
-                                      </p:tavLst>
-                                    </p:anim>
-                                    <p:anim calcmode="lin" valueType="num">
-                                      <p:cBhvr>
-                                        <p:cTn id="22" dur="1000" fill="hold"/>
-                                        <p:tgtEl>
-                                          <p:spTgt spid="3">
-                                            <p:txEl>
-                                              <p:pRg st="1" end="1"/>
-                                            </p:txEl>
-                                          </p:spTgt>
-                                        </p:tgtEl>
-                                        <p:attrNameLst>
-                                          <p:attrName>ppt_y</p:attrName>
-                                        </p:attrNameLst>
-                                      </p:cBhvr>
-                                      <p:tavLst>
-                                        <p:tav tm="0">
-                                          <p:val>
-                                            <p:strVal val="#ppt_y+.1"/>
-                                          </p:val>
-                                        </p:tav>
-                                        <p:tav tm="100000">
-                                          <p:val>
-                                            <p:strVal val="#ppt_y"/>
-                                          </p:val>
-                                        </p:tav>
-                                      </p:tavLst>
-                                    </p:anim>
-                                  </p:childTnLst>
-                                </p:cTn>
-                              </p:par>
-                            </p:childTnLst>
-                          </p:cTn>
-                        </p:par>
-                      </p:childTnLst>
-                    </p:cTn>
-                  </p:par>
-                  <p:par>
-                    <p:cTn id="23" fill="hold">
-                      <p:stCondLst>
-                        <p:cond delay="indefinite"/>
-                      </p:stCondLst>
-                      <p:childTnLst>
-                        <p:par>
-                          <p:cTn id="24" fill="hold">
-                            <p:stCondLst>
-                              <p:cond delay="0"/>
-                            </p:stCondLst>
-                            <p:childTnLst>
-                              <p:par>
-                                <p:cTn id="25" presetID="42" presetClass="entr" presetSubtype="0" fill="hold" grpId="0" nodeType="clickEffect">
-                                  <p:stCondLst>
-                                    <p:cond delay="0"/>
-                                  </p:stCondLst>
-                                  <p:childTnLst>
-                                    <p:set>
-                                      <p:cBhvr>
-                                        <p:cTn id="26" dur="1" fill="hold">
-                                          <p:stCondLst>
-                                            <p:cond delay="0"/>
-                                          </p:stCondLst>
-                                        </p:cTn>
-                                        <p:tgtEl>
-                                          <p:spTgt spid="3">
-                                            <p:txEl>
-                                              <p:pRg st="2" end="2"/>
-                                            </p:txEl>
-                                          </p:spTgt>
-                                        </p:tgtEl>
-                                        <p:attrNameLst>
-                                          <p:attrName>style.visibility</p:attrName>
-                                        </p:attrNameLst>
-                                      </p:cBhvr>
-                                      <p:to>
-                                        <p:strVal val="visible"/>
-                                      </p:to>
-                                    </p:set>
-                                    <p:animEffect transition="in" filter="fade">
-                                      <p:cBhvr>
-                                        <p:cTn id="27" dur="1000"/>
-                                        <p:tgtEl>
-                                          <p:spTgt spid="3">
-                                            <p:txEl>
-                                              <p:pRg st="2" end="2"/>
-                                            </p:txEl>
-                                          </p:spTgt>
-                                        </p:tgtEl>
-                                      </p:cBhvr>
-                                    </p:animEffect>
-                                    <p:anim calcmode="lin" valueType="num">
-                                      <p:cBhvr>
-                                        <p:cTn id="28" dur="1000" fill="hold"/>
-                                        <p:tgtEl>
-                                          <p:spTgt spid="3">
-                                            <p:txEl>
-                                              <p:pRg st="2" end="2"/>
-                                            </p:txEl>
-                                          </p:spTgt>
-                                        </p:tgtEl>
-                                        <p:attrNameLst>
-                                          <p:attrName>ppt_x</p:attrName>
-                                        </p:attrNameLst>
-                                      </p:cBhvr>
-                                      <p:tavLst>
-                                        <p:tav tm="0">
-                                          <p:val>
-                                            <p:strVal val="#ppt_x"/>
-                                          </p:val>
-                                        </p:tav>
-                                        <p:tav tm="100000">
-                                          <p:val>
-                                            <p:strVal val="#ppt_x"/>
-                                          </p:val>
-                                        </p:tav>
-                                      </p:tavLst>
-                                    </p:anim>
-                                    <p:anim calcmode="lin" valueType="num">
-                                      <p:cBhvr>
-                                        <p:cTn id="29" dur="1000" fill="hold"/>
-                                        <p:tgtEl>
-                                          <p:spTgt spid="3">
-                                            <p:txEl>
-                                              <p:pRg st="2" end="2"/>
-                                            </p:txEl>
-                                          </p:spTgt>
-                                        </p:tgtEl>
-                                        <p:attrNameLst>
-                                          <p:attrName>ppt_y</p:attrName>
-                                        </p:attrNameLst>
-                                      </p:cBhvr>
-                                      <p:tavLst>
-                                        <p:tav tm="0">
-                                          <p:val>
-                                            <p:strVal val="#ppt_y+.1"/>
-                                          </p:val>
-                                        </p:tav>
-                                        <p:tav tm="100000">
-                                          <p:val>
-                                            <p:strVal val="#ppt_y"/>
-                                          </p:val>
-                                        </p:tav>
-                                      </p:tavLst>
-                                    </p:anim>
-                                  </p:childTnLst>
-                                </p:cTn>
-                              </p:par>
-                            </p:childTnLst>
-                          </p:cTn>
-                        </p:par>
-                      </p:childTnLst>
-                    </p:cTn>
-                  </p:par>
-                  <p:par>
-                    <p:cTn id="30" fill="hold">
-                      <p:stCondLst>
-                        <p:cond delay="indefinite"/>
-                      </p:stCondLst>
-                      <p:childTnLst>
-                        <p:par>
-                          <p:cTn id="31" fill="hold">
-                            <p:stCondLst>
-                              <p:cond delay="0"/>
-                            </p:stCondLst>
-                            <p:childTnLst>
-                              <p:par>
-                                <p:cTn id="32" presetID="42" presetClass="entr" presetSubtype="0" fill="hold" grpId="0" nodeType="clickEffect">
-                                  <p:stCondLst>
-                                    <p:cond delay="0"/>
-                                  </p:stCondLst>
-                                  <p:childTnLst>
-                                    <p:set>
-                                      <p:cBhvr>
-                                        <p:cTn id="33" dur="1" fill="hold">
-                                          <p:stCondLst>
-                                            <p:cond delay="0"/>
-                                          </p:stCondLst>
-                                        </p:cTn>
-                                        <p:tgtEl>
-                                          <p:spTgt spid="3">
-                                            <p:txEl>
-                                              <p:pRg st="3" end="3"/>
-                                            </p:txEl>
-                                          </p:spTgt>
-                                        </p:tgtEl>
-                                        <p:attrNameLst>
-                                          <p:attrName>style.visibility</p:attrName>
-                                        </p:attrNameLst>
-                                      </p:cBhvr>
-                                      <p:to>
-                                        <p:strVal val="visible"/>
-                                      </p:to>
-                                    </p:set>
-                                    <p:animEffect transition="in" filter="fade">
-                                      <p:cBhvr>
-                                        <p:cTn id="34" dur="1000"/>
-                                        <p:tgtEl>
-                                          <p:spTgt spid="3">
-                                            <p:txEl>
-                                              <p:pRg st="3" end="3"/>
-                                            </p:txEl>
-                                          </p:spTgt>
-                                        </p:tgtEl>
-                                      </p:cBhvr>
-                                    </p:animEffect>
-                                    <p:anim calcmode="lin" valueType="num">
-                                      <p:cBhvr>
-                                        <p:cTn id="35" dur="1000" fill="hold"/>
-                                        <p:tgtEl>
-                                          <p:spTgt spid="3">
-                                            <p:txEl>
-                                              <p:pRg st="3" end="3"/>
-                                            </p:txEl>
-                                          </p:spTgt>
-                                        </p:tgtEl>
-                                        <p:attrNameLst>
-                                          <p:attrName>ppt_x</p:attrName>
-                                        </p:attrNameLst>
-                                      </p:cBhvr>
-                                      <p:tavLst>
-                                        <p:tav tm="0">
-                                          <p:val>
-                                            <p:strVal val="#ppt_x"/>
-                                          </p:val>
-                                        </p:tav>
-                                        <p:tav tm="100000">
-                                          <p:val>
-                                            <p:strVal val="#ppt_x"/>
-                                          </p:val>
-                                        </p:tav>
-                                      </p:tavLst>
-                                    </p:anim>
-                                    <p:anim calcmode="lin" valueType="num">
-                                      <p:cBhvr>
-                                        <p:cTn id="36" dur="1000" fill="hold"/>
-                                        <p:tgtEl>
-                                          <p:spTgt spid="3">
-                                            <p:txEl>
-                                              <p:pRg st="3" end="3"/>
-                                            </p:txEl>
-                                          </p:spTgt>
-                                        </p:tgtEl>
-                                        <p:attrNameLst>
-                                          <p:attrName>ppt_y</p:attrName>
-                                        </p:attrNameLst>
-                                      </p:cBhvr>
-                                      <p:tavLst>
-                                        <p:tav tm="0">
-                                          <p:val>
-                                            <p:strVal val="#ppt_y+.1"/>
-                                          </p:val>
-                                        </p:tav>
-                                        <p:tav tm="100000">
-                                          <p:val>
-                                            <p:strVal val="#ppt_y"/>
-                                          </p:val>
-                                        </p:tav>
-                                      </p:tavLst>
-                                    </p:anim>
-                                  </p:childTnLst>
-                                </p:cTn>
-                              </p:par>
-                            </p:childTnLst>
-                          </p:cTn>
-                        </p:par>
-                      </p:childTnLst>
-                    </p:cTn>
-                  </p:par>
-                  <p:par>
-                    <p:cTn id="37" fill="hold">
-                      <p:stCondLst>
-                        <p:cond delay="indefinite"/>
-                      </p:stCondLst>
-                      <p:childTnLst>
-                        <p:par>
-                          <p:cTn id="38" fill="hold">
-                            <p:stCondLst>
-                              <p:cond delay="0"/>
-                            </p:stCondLst>
-                            <p:childTnLst>
-                              <p:par>
-                                <p:cTn id="39" presetID="42" presetClass="entr" presetSubtype="0" fill="hold" nodeType="clickEffect">
-                                  <p:stCondLst>
-                                    <p:cond delay="0"/>
-                                  </p:stCondLst>
-                                  <p:childTnLst>
-                                    <p:set>
-                                      <p:cBhvr>
-                                        <p:cTn id="40" dur="1" fill="hold">
-                                          <p:stCondLst>
-                                            <p:cond delay="0"/>
-                                          </p:stCondLst>
-                                        </p:cTn>
-                                        <p:tgtEl>
-                                          <p:spTgt spid="4"/>
-                                        </p:tgtEl>
-                                        <p:attrNameLst>
-                                          <p:attrName>style.visibility</p:attrName>
-                                        </p:attrNameLst>
-                                      </p:cBhvr>
-                                      <p:to>
-                                        <p:strVal val="visible"/>
-                                      </p:to>
-                                    </p:set>
-                                    <p:animEffect transition="in" filter="fade">
-                                      <p:cBhvr>
-                                        <p:cTn id="41" dur="1000"/>
-                                        <p:tgtEl>
-                                          <p:spTgt spid="4"/>
-                                        </p:tgtEl>
-                                      </p:cBhvr>
-                                    </p:animEffect>
-                                    <p:anim calcmode="lin" valueType="num">
-                                      <p:cBhvr>
-                                        <p:cTn id="42" dur="1000" fill="hold"/>
-                                        <p:tgtEl>
-                                          <p:spTgt spid="4"/>
-                                        </p:tgtEl>
-                                        <p:attrNameLst>
-                                          <p:attrName>ppt_x</p:attrName>
-                                        </p:attrNameLst>
-                                      </p:cBhvr>
-                                      <p:tavLst>
-                                        <p:tav tm="0">
-                                          <p:val>
-                                            <p:strVal val="#ppt_x"/>
-                                          </p:val>
-                                        </p:tav>
-                                        <p:tav tm="100000">
-                                          <p:val>
-                                            <p:strVal val="#ppt_x"/>
-                                          </p:val>
-                                        </p:tav>
-                                      </p:tavLst>
-                                    </p:anim>
-                                    <p:anim calcmode="lin" valueType="num">
-                                      <p:cBhvr>
-                                        <p:cTn id="43" dur="1000" fill="hold"/>
-                                        <p:tgtEl>
-                                          <p:spTgt spid="4"/>
-                                        </p:tgtEl>
-                                        <p:attrNameLst>
-                                          <p:attrName>ppt_y</p:attrName>
-                                        </p:attrNameLst>
-                                      </p:cBhvr>
-                                      <p:tavLst>
-                                        <p:tav tm="0">
-                                          <p:val>
-                                            <p:strVal val="#ppt_y+.1"/>
-                                          </p:val>
-                                        </p:tav>
-                                        <p:tav tm="100000">
-                                          <p:val>
-                                            <p:strVal val="#ppt_y"/>
-                                          </p:val>
-                                        </p:tav>
-                                      </p:tavLst>
-                                    </p:anim>
-                                  </p:childTnLst>
-                                </p:cTn>
-                              </p:par>
-                            </p:childTnLst>
-                          </p:cTn>
-                        </p:par>
-                      </p:childTnLst>
-                    </p:cTn>
-                  </p:par>
-                </p:childTnLst>
-              </p:cTn>
-              <p:prevCondLst>
-                <p:cond evt="onPrev" delay="0">
-                  <p:tgtEl>
-                    <p:sldTgt/>
-                  </p:tgtEl>
-                </p:cond>
-              </p:prevCondLst>
-              <p:nextCondLst>
-                <p:cond evt="onNext" delay="0">
-                  <p:tgtEl>
-                    <p:sldTgt/>
-                  </p:tgtEl>
-                </p:cond>
-              </p:nextCondLst>
-            </p:seq>
-          </p:childTnLst>
-        </p:cTn>
-      </p:par>
-    </p:tnLst>
-    <p:bldLst>
-      <p:bldP spid="2" grpId="0"/>
-      <p:bldP spid="3" grpId="0" build="p"/>
-    </p:bldLst>
-  </p:timing>
-</p:sld>
-</file>
-
-<file path=ppt/slides/slide4.xml><?xml version="1.0" encoding="utf-8"?>
-<p:sld xmlns:a="http://schemas.openxmlformats.org/drawingml/2006/main" xmlns:r="http://schemas.openxmlformats.org/officeDocument/2006/relationships" xmlns:p="http://schemas.openxmlformats.org/presentationml/2006/main">
-  <p:cSld>
-    <p:spTree>
-      <p:nvGrpSpPr>
-        <p:cNvPr id="1" name=""/>
-        <p:cNvGrpSpPr/>
-        <p:nvPr/>
-      </p:nvGrpSpPr>
-      <p:grpSpPr>
-        <a:xfrm>
-          <a:off x="0" y="0"/>
-          <a:ext cx="0" cy="0"/>
-          <a:chOff x="0" y="0"/>
-          <a:chExt cx="0" cy="0"/>
-        </a:xfrm>
-      </p:grpSpPr>
-      <p:sp>
-        <p:nvSpPr>
-          <p:cNvPr id="2" name="Title 1">
-            <a:extLst>
-              <a:ext uri="{FF2B5EF4-FFF2-40B4-BE49-F238E27FC236}">
                 <a16:creationId xmlns:a16="http://schemas.microsoft.com/office/drawing/2014/main" id="{13182FD3-6C7D-6C4E-252E-520951EBDC12}"/>
               </a:ext>
             </a:extLst>
@@ -15068,7 +14252,7 @@
         </p:spPr>
         <p:txBody>
           <a:bodyPr>
-            <a:normAutofit/>
+            <a:normAutofit fontScale="85000" lnSpcReduction="20000"/>
           </a:bodyPr>
           <a:lstStyle/>
           <a:p>
@@ -15080,14 +14264,40 @@
           <a:p>
             <a:r>
               <a:rPr lang="en-IN" dirty="0"/>
-              <a:t>Docker Compose Small App</a:t>
+              <a:t>Docker compose –v3.0 description in detail</a:t>
             </a:r>
           </a:p>
           <a:p>
             <a:pPr lvl="1"/>
             <a:r>
               <a:rPr lang="en-IN" dirty="0"/>
-              <a:t>Official Docker</a:t>
+              <a:t>https://docs.docker.com/compose/compose-file/03-compose-file/</a:t>
+            </a:r>
+          </a:p>
+          <a:p>
+            <a:r>
+              <a:rPr lang="en-IN" dirty="0"/>
+              <a:t>Docker Compose Small App from Docker page</a:t>
+            </a:r>
+          </a:p>
+          <a:p>
+            <a:pPr lvl="1"/>
+            <a:r>
+              <a:rPr lang="en-IN" dirty="0"/>
+              <a:t>https://docs.docker.com/compose/gettingstarted/</a:t>
+            </a:r>
+          </a:p>
+          <a:p>
+            <a:r>
+              <a:rPr lang="en-IN" dirty="0"/>
+              <a:t>Docker Compose environment variables:</a:t>
+            </a:r>
+          </a:p>
+          <a:p>
+            <a:pPr lvl="1"/>
+            <a:r>
+              <a:rPr lang="en-IN" dirty="0"/>
+              <a:t>https://docs.docker.com/compose/environment-variables/set-environment-variables/</a:t>
             </a:r>
           </a:p>
           <a:p>

</xml_diff>